<commit_message>
CellFactory.Cs : comments and constants added
</commit_message>
<xml_diff>
--- a/High-quality programming code Battlefield 3.pptx
+++ b/High-quality programming code Battlefield 3.pptx
@@ -5333,23 +5333,15 @@
             </a:pPr>
             <a:r>
               <a:rPr lang="en-US" dirty="0" smtClean="0"/>
-              <a:t>Design patterns – factory, memento, observer, </a:t>
-            </a:r>
-            <a:r>
-              <a:rPr lang="en-US" dirty="0" err="1" smtClean="0"/>
-              <a:t>fascade</a:t>
+              <a:t>Design patterns – factory, memento, observer, fascade, iterator, </a:t>
             </a:r>
             <a:r>
               <a:rPr lang="en-US" dirty="0" smtClean="0"/>
-              <a:t>, </a:t>
-            </a:r>
-            <a:r>
-              <a:rPr lang="en-US" dirty="0" err="1" smtClean="0"/>
-              <a:t>iterator</a:t>
+              <a:t>singleton, etc</a:t>
             </a:r>
             <a:r>
               <a:rPr lang="en-US" dirty="0" smtClean="0"/>
-              <a:t>, etc.</a:t>
+              <a:t>.</a:t>
             </a:r>
             <a:endParaRPr lang="bg-BG" dirty="0"/>
           </a:p>

</xml_diff>